<commit_message>
reference added in presentation slide
</commit_message>
<xml_diff>
--- a/Analog Clock.pptx
+++ b/Analog Clock.pptx
@@ -11,8 +11,9 @@
     <p:sldId id="259" r:id="rId5"/>
     <p:sldId id="260" r:id="rId6"/>
     <p:sldId id="261" r:id="rId7"/>
-    <p:sldId id="262" r:id="rId8"/>
-    <p:sldId id="263" r:id="rId9"/>
+    <p:sldId id="264" r:id="rId8"/>
+    <p:sldId id="262" r:id="rId9"/>
+    <p:sldId id="263" r:id="rId10"/>
   </p:sldIdLst>
   <p:sldSz cx="12192000" cy="6858000"/>
   <p:notesSz cx="6858000" cy="9144000"/>
@@ -454,7 +455,7 @@
           <a:p>
             <a:fld id="{D621A525-7C3E-40A0-B68F-CF92F54EB42E}" type="datetimeFigureOut">
               <a:rPr lang="en-US" smtClean="0"/>
-              <a:t>9/2/2023</a:t>
+              <a:t>9/3/2023</a:t>
             </a:fld>
             <a:endParaRPr lang="en-US"/>
           </a:p>
@@ -1542,7 +1543,7 @@
           <a:p>
             <a:fld id="{D621A525-7C3E-40A0-B68F-CF92F54EB42E}" type="datetimeFigureOut">
               <a:rPr lang="en-US" smtClean="0"/>
-              <a:t>9/2/2023</a:t>
+              <a:t>9/3/2023</a:t>
             </a:fld>
             <a:endParaRPr lang="en-US"/>
           </a:p>
@@ -2522,7 +2523,7 @@
           <a:p>
             <a:fld id="{D621A525-7C3E-40A0-B68F-CF92F54EB42E}" type="datetimeFigureOut">
               <a:rPr lang="en-US" smtClean="0"/>
-              <a:t>9/2/2023</a:t>
+              <a:t>9/3/2023</a:t>
             </a:fld>
             <a:endParaRPr lang="en-US"/>
           </a:p>
@@ -3656,7 +3657,7 @@
           <a:p>
             <a:fld id="{D621A525-7C3E-40A0-B68F-CF92F54EB42E}" type="datetimeFigureOut">
               <a:rPr lang="en-US" smtClean="0"/>
-              <a:t>9/2/2023</a:t>
+              <a:t>9/3/2023</a:t>
             </a:fld>
             <a:endParaRPr lang="en-US"/>
           </a:p>
@@ -4689,7 +4690,7 @@
           <a:p>
             <a:fld id="{D621A525-7C3E-40A0-B68F-CF92F54EB42E}" type="datetimeFigureOut">
               <a:rPr lang="en-US" smtClean="0"/>
-              <a:t>9/2/2023</a:t>
+              <a:t>9/3/2023</a:t>
             </a:fld>
             <a:endParaRPr lang="en-US"/>
           </a:p>
@@ -5349,7 +5350,7 @@
           <a:p>
             <a:fld id="{D621A525-7C3E-40A0-B68F-CF92F54EB42E}" type="datetimeFigureOut">
               <a:rPr lang="en-US" smtClean="0"/>
-              <a:t>9/2/2023</a:t>
+              <a:t>9/3/2023</a:t>
             </a:fld>
             <a:endParaRPr lang="en-US"/>
           </a:p>
@@ -6210,7 +6211,7 @@
           <a:p>
             <a:fld id="{D621A525-7C3E-40A0-B68F-CF92F54EB42E}" type="datetimeFigureOut">
               <a:rPr lang="en-US" smtClean="0"/>
-              <a:t>9/2/2023</a:t>
+              <a:t>9/3/2023</a:t>
             </a:fld>
             <a:endParaRPr lang="en-US"/>
           </a:p>
@@ -6400,7 +6401,7 @@
           <a:p>
             <a:fld id="{D621A525-7C3E-40A0-B68F-CF92F54EB42E}" type="datetimeFigureOut">
               <a:rPr lang="en-US" smtClean="0"/>
-              <a:t>9/2/2023</a:t>
+              <a:t>9/3/2023</a:t>
             </a:fld>
             <a:endParaRPr lang="en-US"/>
           </a:p>
@@ -7372,7 +7373,7 @@
           <a:p>
             <a:fld id="{D621A525-7C3E-40A0-B68F-CF92F54EB42E}" type="datetimeFigureOut">
               <a:rPr lang="en-US" smtClean="0"/>
-              <a:t>9/2/2023</a:t>
+              <a:t>9/3/2023</a:t>
             </a:fld>
             <a:endParaRPr lang="en-US"/>
           </a:p>
@@ -7583,7 +7584,7 @@
           <a:p>
             <a:fld id="{D621A525-7C3E-40A0-B68F-CF92F54EB42E}" type="datetimeFigureOut">
               <a:rPr lang="en-US" smtClean="0"/>
-              <a:t>9/2/2023</a:t>
+              <a:t>9/3/2023</a:t>
             </a:fld>
             <a:endParaRPr lang="en-US"/>
           </a:p>
@@ -8617,7 +8618,7 @@
           <a:p>
             <a:fld id="{D621A525-7C3E-40A0-B68F-CF92F54EB42E}" type="datetimeFigureOut">
               <a:rPr lang="en-US" smtClean="0"/>
-              <a:t>9/2/2023</a:t>
+              <a:t>9/3/2023</a:t>
             </a:fld>
             <a:endParaRPr lang="en-US"/>
           </a:p>
@@ -8889,7 +8890,7 @@
           <a:p>
             <a:fld id="{D621A525-7C3E-40A0-B68F-CF92F54EB42E}" type="datetimeFigureOut">
               <a:rPr lang="en-US" smtClean="0"/>
-              <a:t>9/2/2023</a:t>
+              <a:t>9/3/2023</a:t>
             </a:fld>
             <a:endParaRPr lang="en-US"/>
           </a:p>
@@ -9299,7 +9300,7 @@
           <a:p>
             <a:fld id="{D621A525-7C3E-40A0-B68F-CF92F54EB42E}" type="datetimeFigureOut">
               <a:rPr lang="en-US" smtClean="0"/>
-              <a:t>9/2/2023</a:t>
+              <a:t>9/3/2023</a:t>
             </a:fld>
             <a:endParaRPr lang="en-US"/>
           </a:p>
@@ -9426,7 +9427,7 @@
           <a:p>
             <a:fld id="{D621A525-7C3E-40A0-B68F-CF92F54EB42E}" type="datetimeFigureOut">
               <a:rPr lang="en-US" smtClean="0"/>
-              <a:t>9/2/2023</a:t>
+              <a:t>9/3/2023</a:t>
             </a:fld>
             <a:endParaRPr lang="en-US"/>
           </a:p>
@@ -9521,7 +9522,7 @@
           <a:p>
             <a:fld id="{D621A525-7C3E-40A0-B68F-CF92F54EB42E}" type="datetimeFigureOut">
               <a:rPr lang="en-US" smtClean="0"/>
-              <a:t>9/2/2023</a:t>
+              <a:t>9/3/2023</a:t>
             </a:fld>
             <a:endParaRPr lang="en-US"/>
           </a:p>
@@ -10602,7 +10603,7 @@
           <a:p>
             <a:fld id="{D621A525-7C3E-40A0-B68F-CF92F54EB42E}" type="datetimeFigureOut">
               <a:rPr lang="en-US" smtClean="0"/>
-              <a:t>9/2/2023</a:t>
+              <a:t>9/3/2023</a:t>
             </a:fld>
             <a:endParaRPr lang="en-US"/>
           </a:p>
@@ -11710,7 +11711,7 @@
           <a:p>
             <a:fld id="{D621A525-7C3E-40A0-B68F-CF92F54EB42E}" type="datetimeFigureOut">
               <a:rPr lang="en-US" smtClean="0"/>
-              <a:t>9/2/2023</a:t>
+              <a:t>9/3/2023</a:t>
             </a:fld>
             <a:endParaRPr lang="en-US"/>
           </a:p>
@@ -12707,7 +12708,7 @@
           <a:p>
             <a:fld id="{D621A525-7C3E-40A0-B68F-CF92F54EB42E}" type="datetimeFigureOut">
               <a:rPr lang="en-US" smtClean="0"/>
-              <a:t>9/2/2023</a:t>
+              <a:t>9/3/2023</a:t>
             </a:fld>
             <a:endParaRPr lang="en-US"/>
           </a:p>
@@ -14220,6 +14221,94 @@
           <p:cNvPr id="2" name="Title 1">
             <a:extLst>
               <a:ext uri="{FF2B5EF4-FFF2-40B4-BE49-F238E27FC236}">
+                <a16:creationId xmlns:a16="http://schemas.microsoft.com/office/drawing/2014/main" id="{EC07A2E5-D694-7D31-A1EE-51F42253E3A4}"/>
+              </a:ext>
+            </a:extLst>
+          </p:cNvPr>
+          <p:cNvSpPr>
+            <a:spLocks noGrp="1"/>
+          </p:cNvSpPr>
+          <p:nvPr>
+            <p:ph type="title"/>
+          </p:nvPr>
+        </p:nvSpPr>
+        <p:spPr/>
+        <p:txBody>
+          <a:bodyPr/>
+          <a:lstStyle/>
+          <a:p>
+            <a:r>
+              <a:rPr lang="en-US" sz="4800" b="1" dirty="0"/>
+              <a:t>Reference</a:t>
+            </a:r>
+          </a:p>
+        </p:txBody>
+      </p:sp>
+      <p:sp>
+        <p:nvSpPr>
+          <p:cNvPr id="3" name="Content Placeholder 2">
+            <a:extLst>
+              <a:ext uri="{FF2B5EF4-FFF2-40B4-BE49-F238E27FC236}">
+                <a16:creationId xmlns:a16="http://schemas.microsoft.com/office/drawing/2014/main" id="{2F38E05C-9DA0-17A3-EC81-DE8316CAA62E}"/>
+              </a:ext>
+            </a:extLst>
+          </p:cNvPr>
+          <p:cNvSpPr>
+            <a:spLocks noGrp="1"/>
+          </p:cNvSpPr>
+          <p:nvPr>
+            <p:ph idx="1"/>
+          </p:nvPr>
+        </p:nvSpPr>
+        <p:spPr/>
+        <p:txBody>
+          <a:bodyPr>
+            <a:normAutofit/>
+          </a:bodyPr>
+          <a:lstStyle/>
+          <a:p>
+            <a:r>
+              <a:rPr lang="en-US" sz="2800" dirty="0"/>
+              <a:t>https://www.javatpoint.com/cpp-gui</a:t>
+            </a:r>
+          </a:p>
+        </p:txBody>
+      </p:sp>
+    </p:spTree>
+    <p:extLst>
+      <p:ext uri="{BB962C8B-B14F-4D97-AF65-F5344CB8AC3E}">
+        <p14:creationId xmlns:p14="http://schemas.microsoft.com/office/powerpoint/2010/main" val="216067191"/>
+      </p:ext>
+    </p:extLst>
+  </p:cSld>
+  <p:clrMapOvr>
+    <a:masterClrMapping/>
+  </p:clrMapOvr>
+</p:sld>
+</file>
+
+<file path=ppt/slides/slide8.xml><?xml version="1.0" encoding="utf-8"?>
+<p:sld xmlns:a="http://schemas.openxmlformats.org/drawingml/2006/main" xmlns:r="http://schemas.openxmlformats.org/officeDocument/2006/relationships" xmlns:p="http://schemas.openxmlformats.org/presentationml/2006/main">
+  <p:cSld>
+    <p:spTree>
+      <p:nvGrpSpPr>
+        <p:cNvPr id="1" name=""/>
+        <p:cNvGrpSpPr/>
+        <p:nvPr/>
+      </p:nvGrpSpPr>
+      <p:grpSpPr>
+        <a:xfrm>
+          <a:off x="0" y="0"/>
+          <a:ext cx="0" cy="0"/>
+          <a:chOff x="0" y="0"/>
+          <a:chExt cx="0" cy="0"/>
+        </a:xfrm>
+      </p:grpSpPr>
+      <p:sp>
+        <p:nvSpPr>
+          <p:cNvPr id="2" name="Title 1">
+            <a:extLst>
+              <a:ext uri="{FF2B5EF4-FFF2-40B4-BE49-F238E27FC236}">
                 <a16:creationId xmlns:a16="http://schemas.microsoft.com/office/drawing/2014/main" id="{3DD5BC34-D3F7-DE3C-3413-AA5616231C0A}"/>
               </a:ext>
             </a:extLst>
@@ -14303,7 +14392,7 @@
 </p:sld>
 </file>
 
-<file path=ppt/slides/slide8.xml><?xml version="1.0" encoding="utf-8"?>
+<file path=ppt/slides/slide9.xml><?xml version="1.0" encoding="utf-8"?>
 <p:sld xmlns:a="http://schemas.openxmlformats.org/drawingml/2006/main" xmlns:r="http://schemas.openxmlformats.org/officeDocument/2006/relationships" xmlns:p="http://schemas.openxmlformats.org/presentationml/2006/main">
   <p:cSld>
     <p:spTree>

</xml_diff>